<commit_message>
Implementation of web service.
Signed-off-by: Ajay Srivastava <ajay_srivastava@rediffmail.com>
</commit_message>
<xml_diff>
--- a/docs/hello_service.pptx
+++ b/docs/hello_service.pptx
@@ -115,6 +115,11 @@
       </a:defRPr>
     </a:lvl9pPr>
   </p:defaultTextStyle>
+  <p:extLst>
+    <p:ext uri="{EFAFB233-063F-42B5-8137-9DF3F51BA10A}">
+      <p15:sldGuideLst xmlns:p15="http://schemas.microsoft.com/office/powerpoint/2012/main"/>
+    </p:ext>
+  </p:extLst>
 </p:presentation>
 </file>
 
@@ -267,7 +272,7 @@
           <a:p>
             <a:fld id="{07EE2FA9-72B7-40BD-9EDB-9B3CDEB97273}" type="datetimeFigureOut">
               <a:rPr lang="en-IN" smtClean="0"/>
-              <a:t>19-10-2022</a:t>
+              <a:t>20-10-2022</a:t>
             </a:fld>
             <a:endParaRPr lang="en-IN"/>
           </a:p>
@@ -467,7 +472,7 @@
           <a:p>
             <a:fld id="{07EE2FA9-72B7-40BD-9EDB-9B3CDEB97273}" type="datetimeFigureOut">
               <a:rPr lang="en-IN" smtClean="0"/>
-              <a:t>19-10-2022</a:t>
+              <a:t>20-10-2022</a:t>
             </a:fld>
             <a:endParaRPr lang="en-IN"/>
           </a:p>
@@ -677,7 +682,7 @@
           <a:p>
             <a:fld id="{07EE2FA9-72B7-40BD-9EDB-9B3CDEB97273}" type="datetimeFigureOut">
               <a:rPr lang="en-IN" smtClean="0"/>
-              <a:t>19-10-2022</a:t>
+              <a:t>20-10-2022</a:t>
             </a:fld>
             <a:endParaRPr lang="en-IN"/>
           </a:p>
@@ -877,7 +882,7 @@
           <a:p>
             <a:fld id="{07EE2FA9-72B7-40BD-9EDB-9B3CDEB97273}" type="datetimeFigureOut">
               <a:rPr lang="en-IN" smtClean="0"/>
-              <a:t>19-10-2022</a:t>
+              <a:t>20-10-2022</a:t>
             </a:fld>
             <a:endParaRPr lang="en-IN"/>
           </a:p>
@@ -1153,7 +1158,7 @@
           <a:p>
             <a:fld id="{07EE2FA9-72B7-40BD-9EDB-9B3CDEB97273}" type="datetimeFigureOut">
               <a:rPr lang="en-IN" smtClean="0"/>
-              <a:t>19-10-2022</a:t>
+              <a:t>20-10-2022</a:t>
             </a:fld>
             <a:endParaRPr lang="en-IN"/>
           </a:p>
@@ -1421,7 +1426,7 @@
           <a:p>
             <a:fld id="{07EE2FA9-72B7-40BD-9EDB-9B3CDEB97273}" type="datetimeFigureOut">
               <a:rPr lang="en-IN" smtClean="0"/>
-              <a:t>19-10-2022</a:t>
+              <a:t>20-10-2022</a:t>
             </a:fld>
             <a:endParaRPr lang="en-IN"/>
           </a:p>
@@ -1836,7 +1841,7 @@
           <a:p>
             <a:fld id="{07EE2FA9-72B7-40BD-9EDB-9B3CDEB97273}" type="datetimeFigureOut">
               <a:rPr lang="en-IN" smtClean="0"/>
-              <a:t>19-10-2022</a:t>
+              <a:t>20-10-2022</a:t>
             </a:fld>
             <a:endParaRPr lang="en-IN"/>
           </a:p>
@@ -1978,7 +1983,7 @@
           <a:p>
             <a:fld id="{07EE2FA9-72B7-40BD-9EDB-9B3CDEB97273}" type="datetimeFigureOut">
               <a:rPr lang="en-IN" smtClean="0"/>
-              <a:t>19-10-2022</a:t>
+              <a:t>20-10-2022</a:t>
             </a:fld>
             <a:endParaRPr lang="en-IN"/>
           </a:p>
@@ -2091,7 +2096,7 @@
           <a:p>
             <a:fld id="{07EE2FA9-72B7-40BD-9EDB-9B3CDEB97273}" type="datetimeFigureOut">
               <a:rPr lang="en-IN" smtClean="0"/>
-              <a:t>19-10-2022</a:t>
+              <a:t>20-10-2022</a:t>
             </a:fld>
             <a:endParaRPr lang="en-IN"/>
           </a:p>
@@ -2404,7 +2409,7 @@
           <a:p>
             <a:fld id="{07EE2FA9-72B7-40BD-9EDB-9B3CDEB97273}" type="datetimeFigureOut">
               <a:rPr lang="en-IN" smtClean="0"/>
-              <a:t>19-10-2022</a:t>
+              <a:t>20-10-2022</a:t>
             </a:fld>
             <a:endParaRPr lang="en-IN"/>
           </a:p>
@@ -2693,7 +2698,7 @@
           <a:p>
             <a:fld id="{07EE2FA9-72B7-40BD-9EDB-9B3CDEB97273}" type="datetimeFigureOut">
               <a:rPr lang="en-IN" smtClean="0"/>
-              <a:t>19-10-2022</a:t>
+              <a:t>20-10-2022</a:t>
             </a:fld>
             <a:endParaRPr lang="en-IN"/>
           </a:p>
@@ -2936,7 +2941,7 @@
           <a:p>
             <a:fld id="{07EE2FA9-72B7-40BD-9EDB-9B3CDEB97273}" type="datetimeFigureOut">
               <a:rPr lang="en-IN" smtClean="0"/>
-              <a:t>19-10-2022</a:t>
+              <a:t>20-10-2022</a:t>
             </a:fld>
             <a:endParaRPr lang="en-IN"/>
           </a:p>
@@ -5992,7 +5997,7 @@
               <a:rPr lang="en-US" dirty="0">
                 <a:hlinkClick r:id="rId2"/>
               </a:rPr>
-              <a:t>http://helloservice/v1/user/id</a:t>
+              <a:t>http://app/hello/v1/user/id</a:t>
             </a:r>
             <a:endParaRPr lang="en-US" dirty="0"/>
           </a:p>

</xml_diff>

<commit_message>
Check if CI/CD is triggered on main branch too.
Signed-off-by: Ajay Srivastava <ajay_srivastava@rediffmail.com>
</commit_message>
<xml_diff>
--- a/docs/hello_service.pptx
+++ b/docs/hello_service.pptx
@@ -272,7 +272,7 @@
           <a:p>
             <a:fld id="{07EE2FA9-72B7-40BD-9EDB-9B3CDEB97273}" type="datetimeFigureOut">
               <a:rPr lang="en-IN" smtClean="0"/>
-              <a:t>20-10-2022</a:t>
+              <a:t>23-10-2022</a:t>
             </a:fld>
             <a:endParaRPr lang="en-IN"/>
           </a:p>
@@ -472,7 +472,7 @@
           <a:p>
             <a:fld id="{07EE2FA9-72B7-40BD-9EDB-9B3CDEB97273}" type="datetimeFigureOut">
               <a:rPr lang="en-IN" smtClean="0"/>
-              <a:t>20-10-2022</a:t>
+              <a:t>23-10-2022</a:t>
             </a:fld>
             <a:endParaRPr lang="en-IN"/>
           </a:p>
@@ -682,7 +682,7 @@
           <a:p>
             <a:fld id="{07EE2FA9-72B7-40BD-9EDB-9B3CDEB97273}" type="datetimeFigureOut">
               <a:rPr lang="en-IN" smtClean="0"/>
-              <a:t>20-10-2022</a:t>
+              <a:t>23-10-2022</a:t>
             </a:fld>
             <a:endParaRPr lang="en-IN"/>
           </a:p>
@@ -882,7 +882,7 @@
           <a:p>
             <a:fld id="{07EE2FA9-72B7-40BD-9EDB-9B3CDEB97273}" type="datetimeFigureOut">
               <a:rPr lang="en-IN" smtClean="0"/>
-              <a:t>20-10-2022</a:t>
+              <a:t>23-10-2022</a:t>
             </a:fld>
             <a:endParaRPr lang="en-IN"/>
           </a:p>
@@ -1158,7 +1158,7 @@
           <a:p>
             <a:fld id="{07EE2FA9-72B7-40BD-9EDB-9B3CDEB97273}" type="datetimeFigureOut">
               <a:rPr lang="en-IN" smtClean="0"/>
-              <a:t>20-10-2022</a:t>
+              <a:t>23-10-2022</a:t>
             </a:fld>
             <a:endParaRPr lang="en-IN"/>
           </a:p>
@@ -1426,7 +1426,7 @@
           <a:p>
             <a:fld id="{07EE2FA9-72B7-40BD-9EDB-9B3CDEB97273}" type="datetimeFigureOut">
               <a:rPr lang="en-IN" smtClean="0"/>
-              <a:t>20-10-2022</a:t>
+              <a:t>23-10-2022</a:t>
             </a:fld>
             <a:endParaRPr lang="en-IN"/>
           </a:p>
@@ -1841,7 +1841,7 @@
           <a:p>
             <a:fld id="{07EE2FA9-72B7-40BD-9EDB-9B3CDEB97273}" type="datetimeFigureOut">
               <a:rPr lang="en-IN" smtClean="0"/>
-              <a:t>20-10-2022</a:t>
+              <a:t>23-10-2022</a:t>
             </a:fld>
             <a:endParaRPr lang="en-IN"/>
           </a:p>
@@ -1983,7 +1983,7 @@
           <a:p>
             <a:fld id="{07EE2FA9-72B7-40BD-9EDB-9B3CDEB97273}" type="datetimeFigureOut">
               <a:rPr lang="en-IN" smtClean="0"/>
-              <a:t>20-10-2022</a:t>
+              <a:t>23-10-2022</a:t>
             </a:fld>
             <a:endParaRPr lang="en-IN"/>
           </a:p>
@@ -2096,7 +2096,7 @@
           <a:p>
             <a:fld id="{07EE2FA9-72B7-40BD-9EDB-9B3CDEB97273}" type="datetimeFigureOut">
               <a:rPr lang="en-IN" smtClean="0"/>
-              <a:t>20-10-2022</a:t>
+              <a:t>23-10-2022</a:t>
             </a:fld>
             <a:endParaRPr lang="en-IN"/>
           </a:p>
@@ -2409,7 +2409,7 @@
           <a:p>
             <a:fld id="{07EE2FA9-72B7-40BD-9EDB-9B3CDEB97273}" type="datetimeFigureOut">
               <a:rPr lang="en-IN" smtClean="0"/>
-              <a:t>20-10-2022</a:t>
+              <a:t>23-10-2022</a:t>
             </a:fld>
             <a:endParaRPr lang="en-IN"/>
           </a:p>
@@ -2698,7 +2698,7 @@
           <a:p>
             <a:fld id="{07EE2FA9-72B7-40BD-9EDB-9B3CDEB97273}" type="datetimeFigureOut">
               <a:rPr lang="en-IN" smtClean="0"/>
-              <a:t>20-10-2022</a:t>
+              <a:t>23-10-2022</a:t>
             </a:fld>
             <a:endParaRPr lang="en-IN"/>
           </a:p>
@@ -2941,7 +2941,7 @@
           <a:p>
             <a:fld id="{07EE2FA9-72B7-40BD-9EDB-9B3CDEB97273}" type="datetimeFigureOut">
               <a:rPr lang="en-IN" smtClean="0"/>
-              <a:t>20-10-2022</a:t>
+              <a:t>23-10-2022</a:t>
             </a:fld>
             <a:endParaRPr lang="en-IN"/>
           </a:p>
@@ -6909,7 +6909,7 @@
           <p:nvPr>
             <p:extLst>
               <p:ext uri="{D42A27DB-BD31-4B8C-83A1-F6EECF244321}">
-                <p14:modId xmlns:p14="http://schemas.microsoft.com/office/powerpoint/2010/main" val="1014001364"/>
+                <p14:modId xmlns:p14="http://schemas.microsoft.com/office/powerpoint/2010/main" val="1155133181"/>
               </p:ext>
             </p:extLst>
           </p:nvPr>
@@ -7061,7 +7061,7 @@
                       </a:r>
                       <a:r>
                         <a:rPr lang="en-US" dirty="0"/>
-                        <a:t> action</a:t>
+                        <a:t> hooks</a:t>
                       </a:r>
                       <a:endParaRPr lang="en-IN" dirty="0"/>
                     </a:p>
@@ -7117,8 +7117,12 @@
                         <a:t>github</a:t>
                       </a:r>
                       <a:r>
+                        <a:rPr lang="en-US"/>
+                        <a:t> hook </a:t>
+                      </a:r>
+                      <a:r>
                         <a:rPr lang="en-US" dirty="0"/>
-                        <a:t> action and Jenkins job</a:t>
+                        <a:t>and Jenkins job</a:t>
                       </a:r>
                       <a:endParaRPr lang="en-IN" dirty="0"/>
                     </a:p>

</xml_diff>